<commit_message>
Atualização 30jun2022 - Versão01
</commit_message>
<xml_diff>
--- a/testes.pptx
+++ b/testes.pptx
@@ -290,7 +290,7 @@
           <a:p>
             <a:fld id="{DA509BC0-9C42-4D36-9592-D0E11C41C19E}" type="datetimeFigureOut">
               <a:rPr lang="pt-BR" smtClean="0"/>
-              <a:t>22/06/2022</a:t>
+              <a:t>01/07/2022</a:t>
             </a:fld>
             <a:endParaRPr lang="pt-BR"/>
           </a:p>
@@ -460,7 +460,7 @@
           <a:p>
             <a:fld id="{DA509BC0-9C42-4D36-9592-D0E11C41C19E}" type="datetimeFigureOut">
               <a:rPr lang="pt-BR" smtClean="0"/>
-              <a:t>22/06/2022</a:t>
+              <a:t>01/07/2022</a:t>
             </a:fld>
             <a:endParaRPr lang="pt-BR"/>
           </a:p>
@@ -640,7 +640,7 @@
           <a:p>
             <a:fld id="{DA509BC0-9C42-4D36-9592-D0E11C41C19E}" type="datetimeFigureOut">
               <a:rPr lang="pt-BR" smtClean="0"/>
-              <a:t>22/06/2022</a:t>
+              <a:t>01/07/2022</a:t>
             </a:fld>
             <a:endParaRPr lang="pt-BR"/>
           </a:p>
@@ -810,7 +810,7 @@
           <a:p>
             <a:fld id="{DA509BC0-9C42-4D36-9592-D0E11C41C19E}" type="datetimeFigureOut">
               <a:rPr lang="pt-BR" smtClean="0"/>
-              <a:t>22/06/2022</a:t>
+              <a:t>01/07/2022</a:t>
             </a:fld>
             <a:endParaRPr lang="pt-BR"/>
           </a:p>
@@ -1056,7 +1056,7 @@
           <a:p>
             <a:fld id="{DA509BC0-9C42-4D36-9592-D0E11C41C19E}" type="datetimeFigureOut">
               <a:rPr lang="pt-BR" smtClean="0"/>
-              <a:t>22/06/2022</a:t>
+              <a:t>01/07/2022</a:t>
             </a:fld>
             <a:endParaRPr lang="pt-BR"/>
           </a:p>
@@ -1288,7 +1288,7 @@
           <a:p>
             <a:fld id="{DA509BC0-9C42-4D36-9592-D0E11C41C19E}" type="datetimeFigureOut">
               <a:rPr lang="pt-BR" smtClean="0"/>
-              <a:t>22/06/2022</a:t>
+              <a:t>01/07/2022</a:t>
             </a:fld>
             <a:endParaRPr lang="pt-BR"/>
           </a:p>
@@ -1655,7 +1655,7 @@
           <a:p>
             <a:fld id="{DA509BC0-9C42-4D36-9592-D0E11C41C19E}" type="datetimeFigureOut">
               <a:rPr lang="pt-BR" smtClean="0"/>
-              <a:t>22/06/2022</a:t>
+              <a:t>01/07/2022</a:t>
             </a:fld>
             <a:endParaRPr lang="pt-BR"/>
           </a:p>
@@ -1773,7 +1773,7 @@
           <a:p>
             <a:fld id="{DA509BC0-9C42-4D36-9592-D0E11C41C19E}" type="datetimeFigureOut">
               <a:rPr lang="pt-BR" smtClean="0"/>
-              <a:t>22/06/2022</a:t>
+              <a:t>01/07/2022</a:t>
             </a:fld>
             <a:endParaRPr lang="pt-BR"/>
           </a:p>
@@ -1868,7 +1868,7 @@
           <a:p>
             <a:fld id="{DA509BC0-9C42-4D36-9592-D0E11C41C19E}" type="datetimeFigureOut">
               <a:rPr lang="pt-BR" smtClean="0"/>
-              <a:t>22/06/2022</a:t>
+              <a:t>01/07/2022</a:t>
             </a:fld>
             <a:endParaRPr lang="pt-BR"/>
           </a:p>
@@ -2145,7 +2145,7 @@
           <a:p>
             <a:fld id="{DA509BC0-9C42-4D36-9592-D0E11C41C19E}" type="datetimeFigureOut">
               <a:rPr lang="pt-BR" smtClean="0"/>
-              <a:t>22/06/2022</a:t>
+              <a:t>01/07/2022</a:t>
             </a:fld>
             <a:endParaRPr lang="pt-BR"/>
           </a:p>
@@ -2398,7 +2398,7 @@
           <a:p>
             <a:fld id="{DA509BC0-9C42-4D36-9592-D0E11C41C19E}" type="datetimeFigureOut">
               <a:rPr lang="pt-BR" smtClean="0"/>
-              <a:t>22/06/2022</a:t>
+              <a:t>01/07/2022</a:t>
             </a:fld>
             <a:endParaRPr lang="pt-BR"/>
           </a:p>
@@ -2611,7 +2611,7 @@
           <a:p>
             <a:fld id="{DA509BC0-9C42-4D36-9592-D0E11C41C19E}" type="datetimeFigureOut">
               <a:rPr lang="pt-BR" smtClean="0"/>
-              <a:t>22/06/2022</a:t>
+              <a:t>01/07/2022</a:t>
             </a:fld>
             <a:endParaRPr lang="pt-BR"/>
           </a:p>
@@ -3640,6 +3640,30 @@
           <a:chExt cx="0" cy="0"/>
         </a:xfrm>
       </p:grpSpPr>
+      <p:pic>
+        <p:nvPicPr>
+          <p:cNvPr id="2" name="Imagem 1"/>
+          <p:cNvPicPr>
+            <a:picLocks noChangeAspect="1"/>
+          </p:cNvPicPr>
+          <p:nvPr/>
+        </p:nvPicPr>
+        <p:blipFill>
+          <a:blip r:embed="rId2"/>
+          <a:stretch>
+            <a:fillRect/>
+          </a:stretch>
+        </p:blipFill>
+        <p:spPr>
+          <a:xfrm>
+            <a:off x="1943100" y="804862"/>
+            <a:ext cx="8305800" cy="5248275"/>
+          </a:xfrm>
+          <a:prstGeom prst="rect">
+            <a:avLst/>
+          </a:prstGeom>
+        </p:spPr>
+      </p:pic>
     </p:spTree>
     <p:extLst>
       <p:ext uri="{BB962C8B-B14F-4D97-AF65-F5344CB8AC3E}">
@@ -3670,6 +3694,30 @@
           <a:chExt cx="0" cy="0"/>
         </a:xfrm>
       </p:grpSpPr>
+      <p:pic>
+        <p:nvPicPr>
+          <p:cNvPr id="2" name="Imagem 1"/>
+          <p:cNvPicPr>
+            <a:picLocks noChangeAspect="1"/>
+          </p:cNvPicPr>
+          <p:nvPr/>
+        </p:nvPicPr>
+        <p:blipFill>
+          <a:blip r:embed="rId2"/>
+          <a:stretch>
+            <a:fillRect/>
+          </a:stretch>
+        </p:blipFill>
+        <p:spPr>
+          <a:xfrm>
+            <a:off x="2033587" y="1047750"/>
+            <a:ext cx="8124825" cy="4762500"/>
+          </a:xfrm>
+          <a:prstGeom prst="rect">
+            <a:avLst/>
+          </a:prstGeom>
+        </p:spPr>
+      </p:pic>
     </p:spTree>
     <p:extLst>
       <p:ext uri="{BB962C8B-B14F-4D97-AF65-F5344CB8AC3E}">
@@ -3700,6 +3748,30 @@
           <a:chExt cx="0" cy="0"/>
         </a:xfrm>
       </p:grpSpPr>
+      <p:pic>
+        <p:nvPicPr>
+          <p:cNvPr id="2" name="Imagem 1"/>
+          <p:cNvPicPr>
+            <a:picLocks noChangeAspect="1"/>
+          </p:cNvPicPr>
+          <p:nvPr/>
+        </p:nvPicPr>
+        <p:blipFill>
+          <a:blip r:embed="rId2"/>
+          <a:stretch>
+            <a:fillRect/>
+          </a:stretch>
+        </p:blipFill>
+        <p:spPr>
+          <a:xfrm>
+            <a:off x="2019300" y="1038225"/>
+            <a:ext cx="8153400" cy="4781550"/>
+          </a:xfrm>
+          <a:prstGeom prst="rect">
+            <a:avLst/>
+          </a:prstGeom>
+        </p:spPr>
+      </p:pic>
     </p:spTree>
     <p:extLst>
       <p:ext uri="{BB962C8B-B14F-4D97-AF65-F5344CB8AC3E}">
@@ -3730,6 +3802,30 @@
           <a:chExt cx="0" cy="0"/>
         </a:xfrm>
       </p:grpSpPr>
+      <p:pic>
+        <p:nvPicPr>
+          <p:cNvPr id="2" name="Imagem 1"/>
+          <p:cNvPicPr>
+            <a:picLocks noChangeAspect="1"/>
+          </p:cNvPicPr>
+          <p:nvPr/>
+        </p:nvPicPr>
+        <p:blipFill>
+          <a:blip r:embed="rId2"/>
+          <a:stretch>
+            <a:fillRect/>
+          </a:stretch>
+        </p:blipFill>
+        <p:spPr>
+          <a:xfrm>
+            <a:off x="1966912" y="1157287"/>
+            <a:ext cx="8258175" cy="4543425"/>
+          </a:xfrm>
+          <a:prstGeom prst="rect">
+            <a:avLst/>
+          </a:prstGeom>
+        </p:spPr>
+      </p:pic>
     </p:spTree>
     <p:extLst>
       <p:ext uri="{BB962C8B-B14F-4D97-AF65-F5344CB8AC3E}">
@@ -3760,6 +3856,30 @@
           <a:chExt cx="0" cy="0"/>
         </a:xfrm>
       </p:grpSpPr>
+      <p:pic>
+        <p:nvPicPr>
+          <p:cNvPr id="2" name="Imagem 1"/>
+          <p:cNvPicPr>
+            <a:picLocks noChangeAspect="1"/>
+          </p:cNvPicPr>
+          <p:nvPr/>
+        </p:nvPicPr>
+        <p:blipFill>
+          <a:blip r:embed="rId2"/>
+          <a:stretch>
+            <a:fillRect/>
+          </a:stretch>
+        </p:blipFill>
+        <p:spPr>
+          <a:xfrm>
+            <a:off x="1995487" y="1104900"/>
+            <a:ext cx="8201025" cy="4648200"/>
+          </a:xfrm>
+          <a:prstGeom prst="rect">
+            <a:avLst/>
+          </a:prstGeom>
+        </p:spPr>
+      </p:pic>
     </p:spTree>
     <p:extLst>
       <p:ext uri="{BB962C8B-B14F-4D97-AF65-F5344CB8AC3E}">
@@ -3790,6 +3910,30 @@
           <a:chExt cx="0" cy="0"/>
         </a:xfrm>
       </p:grpSpPr>
+      <p:pic>
+        <p:nvPicPr>
+          <p:cNvPr id="2" name="Imagem 1"/>
+          <p:cNvPicPr>
+            <a:picLocks noChangeAspect="1"/>
+          </p:cNvPicPr>
+          <p:nvPr/>
+        </p:nvPicPr>
+        <p:blipFill>
+          <a:blip r:embed="rId2"/>
+          <a:stretch>
+            <a:fillRect/>
+          </a:stretch>
+        </p:blipFill>
+        <p:spPr>
+          <a:xfrm>
+            <a:off x="1962150" y="695325"/>
+            <a:ext cx="8267700" cy="5467350"/>
+          </a:xfrm>
+          <a:prstGeom prst="rect">
+            <a:avLst/>
+          </a:prstGeom>
+        </p:spPr>
+      </p:pic>
     </p:spTree>
     <p:extLst>
       <p:ext uri="{BB962C8B-B14F-4D97-AF65-F5344CB8AC3E}">
@@ -3820,6 +3964,30 @@
           <a:chExt cx="0" cy="0"/>
         </a:xfrm>
       </p:grpSpPr>
+      <p:pic>
+        <p:nvPicPr>
+          <p:cNvPr id="2" name="Imagem 1"/>
+          <p:cNvPicPr>
+            <a:picLocks noChangeAspect="1"/>
+          </p:cNvPicPr>
+          <p:nvPr/>
+        </p:nvPicPr>
+        <p:blipFill>
+          <a:blip r:embed="rId2"/>
+          <a:stretch>
+            <a:fillRect/>
+          </a:stretch>
+        </p:blipFill>
+        <p:spPr>
+          <a:xfrm>
+            <a:off x="1985962" y="828675"/>
+            <a:ext cx="8220075" cy="5200650"/>
+          </a:xfrm>
+          <a:prstGeom prst="rect">
+            <a:avLst/>
+          </a:prstGeom>
+        </p:spPr>
+      </p:pic>
     </p:spTree>
     <p:extLst>
       <p:ext uri="{BB962C8B-B14F-4D97-AF65-F5344CB8AC3E}">
@@ -3850,6 +4018,30 @@
           <a:chExt cx="0" cy="0"/>
         </a:xfrm>
       </p:grpSpPr>
+      <p:pic>
+        <p:nvPicPr>
+          <p:cNvPr id="2" name="Imagem 1"/>
+          <p:cNvPicPr>
+            <a:picLocks noChangeAspect="1"/>
+          </p:cNvPicPr>
+          <p:nvPr/>
+        </p:nvPicPr>
+        <p:blipFill>
+          <a:blip r:embed="rId2"/>
+          <a:stretch>
+            <a:fillRect/>
+          </a:stretch>
+        </p:blipFill>
+        <p:spPr>
+          <a:xfrm>
+            <a:off x="2000250" y="1023937"/>
+            <a:ext cx="8191500" cy="4810125"/>
+          </a:xfrm>
+          <a:prstGeom prst="rect">
+            <a:avLst/>
+          </a:prstGeom>
+        </p:spPr>
+      </p:pic>
     </p:spTree>
     <p:extLst>
       <p:ext uri="{BB962C8B-B14F-4D97-AF65-F5344CB8AC3E}">
@@ -3880,6 +4072,30 @@
           <a:chExt cx="0" cy="0"/>
         </a:xfrm>
       </p:grpSpPr>
+      <p:pic>
+        <p:nvPicPr>
+          <p:cNvPr id="2" name="Imagem 1"/>
+          <p:cNvPicPr>
+            <a:picLocks noChangeAspect="1"/>
+          </p:cNvPicPr>
+          <p:nvPr/>
+        </p:nvPicPr>
+        <p:blipFill>
+          <a:blip r:embed="rId2"/>
+          <a:stretch>
+            <a:fillRect/>
+          </a:stretch>
+        </p:blipFill>
+        <p:spPr>
+          <a:xfrm>
+            <a:off x="1966912" y="1109662"/>
+            <a:ext cx="8258175" cy="4638675"/>
+          </a:xfrm>
+          <a:prstGeom prst="rect">
+            <a:avLst/>
+          </a:prstGeom>
+        </p:spPr>
+      </p:pic>
     </p:spTree>
     <p:extLst>
       <p:ext uri="{BB962C8B-B14F-4D97-AF65-F5344CB8AC3E}">
@@ -3910,6 +4126,30 @@
           <a:chExt cx="0" cy="0"/>
         </a:xfrm>
       </p:grpSpPr>
+      <p:pic>
+        <p:nvPicPr>
+          <p:cNvPr id="2" name="Imagem 1"/>
+          <p:cNvPicPr>
+            <a:picLocks noChangeAspect="1"/>
+          </p:cNvPicPr>
+          <p:nvPr/>
+        </p:nvPicPr>
+        <p:blipFill>
+          <a:blip r:embed="rId2"/>
+          <a:stretch>
+            <a:fillRect/>
+          </a:stretch>
+        </p:blipFill>
+        <p:spPr>
+          <a:xfrm>
+            <a:off x="1943100" y="866775"/>
+            <a:ext cx="8305800" cy="5124450"/>
+          </a:xfrm>
+          <a:prstGeom prst="rect">
+            <a:avLst/>
+          </a:prstGeom>
+        </p:spPr>
+      </p:pic>
     </p:spTree>
     <p:extLst>
       <p:ext uri="{BB962C8B-B14F-4D97-AF65-F5344CB8AC3E}">

</xml_diff>